<commit_message>
some error & setting, screenshot
</commit_message>
<xml_diff>
--- a/architecture.pptx
+++ b/architecture.pptx
@@ -7,6 +7,7 @@
   <p:sldIdLst>
     <p:sldId id="256" r:id="rId2"/>
     <p:sldId id="257" r:id="rId3"/>
+    <p:sldId id="258" r:id="rId4"/>
   </p:sldIdLst>
   <p:sldSz cx="12192000" cy="6858000"/>
   <p:notesSz cx="6858000" cy="9144000"/>
@@ -105,12 +106,28 @@
       </a:defRPr>
     </a:lvl9pPr>
   </p:defaultTextStyle>
+  <p:extLst>
+    <p:ext uri="{521415D9-36F7-43E2-AB2F-B90AF26B5E84}">
+      <p14:sectionLst xmlns:p14="http://schemas.microsoft.com/office/powerpoint/2010/main">
+        <p14:section name="기본 구역" id="{519D14FF-D67B-4522-8436-2D266570A68A}">
+          <p14:sldIdLst>
+            <p14:sldId id="256"/>
+            <p14:sldId id="257"/>
+            <p14:sldId id="258"/>
+          </p14:sldIdLst>
+        </p14:section>
+      </p14:sectionLst>
+    </p:ext>
+    <p:ext uri="{EFAFB233-063F-42B5-8137-9DF3F51BA10A}">
+      <p15:sldGuideLst xmlns:p15="http://schemas.microsoft.com/office/powerpoint/2012/main"/>
+    </p:ext>
+  </p:extLst>
 </p:presentation>
 </file>
 
 <file path=ppt/commentAuthors.xml><?xml version="1.0" encoding="utf-8"?>
 <p:cmAuthorLst xmlns:a="http://schemas.openxmlformats.org/drawingml/2006/main" xmlns:r="http://schemas.openxmlformats.org/officeDocument/2006/relationships" xmlns:p="http://schemas.openxmlformats.org/presentationml/2006/main">
-  <p:cmAuthor id="1" name="Lee DongChan" initials="LD" lastIdx="1" clrIdx="0">
+  <p:cmAuthor id="1" name="Lee DongChan" initials="LD" lastIdx="2" clrIdx="0">
     <p:extLst>
       <p:ext uri="{19B8F6BF-5375-455C-9EA6-DF929625EA0E}">
         <p15:presenceInfo xmlns:p15="http://schemas.microsoft.com/office/powerpoint/2012/main" userId="2351e7ecfaba754c" providerId="Windows Live"/>
@@ -118,6 +135,321 @@
     </p:extLst>
   </p:cmAuthor>
 </p:cmAuthorLst>
+</file>
+
+<file path=ppt/changesInfos/changesInfo1.xml><?xml version="1.0" encoding="utf-8"?>
+<pc:chgInfo xmlns:a="http://schemas.openxmlformats.org/drawingml/2006/main" xmlns:r="http://schemas.openxmlformats.org/officeDocument/2006/relationships" xmlns:ac="http://schemas.microsoft.com/office/drawing/2013/main/command" xmlns:pc="http://schemas.microsoft.com/office/powerpoint/2013/main/command">
+  <pc:docChgLst>
+    <pc:chgData name="Lee DongChan" userId="2351e7ecfaba754c" providerId="LiveId" clId="{CA37A7DB-0233-4F77-A408-1A694C71E128}"/>
+    <pc:docChg chg="undo custSel addSld modSld addSection delSection">
+      <pc:chgData name="Lee DongChan" userId="2351e7ecfaba754c" providerId="LiveId" clId="{CA37A7DB-0233-4F77-A408-1A694C71E128}" dt="2021-02-02T14:53:48.680" v="766" actId="692"/>
+      <pc:docMkLst>
+        <pc:docMk/>
+      </pc:docMkLst>
+      <pc:sldChg chg="modSp mod setBg">
+        <pc:chgData name="Lee DongChan" userId="2351e7ecfaba754c" providerId="LiveId" clId="{CA37A7DB-0233-4F77-A408-1A694C71E128}" dt="2021-02-02T14:34:41.453" v="650" actId="207"/>
+        <pc:sldMkLst>
+          <pc:docMk/>
+          <pc:sldMk cId="1063827343" sldId="256"/>
+        </pc:sldMkLst>
+        <pc:spChg chg="mod">
+          <ac:chgData name="Lee DongChan" userId="2351e7ecfaba754c" providerId="LiveId" clId="{CA37A7DB-0233-4F77-A408-1A694C71E128}" dt="2021-02-02T14:34:41.453" v="650" actId="207"/>
+          <ac:spMkLst>
+            <pc:docMk/>
+            <pc:sldMk cId="1063827343" sldId="256"/>
+            <ac:spMk id="2" creationId="{4A799A65-58E6-4F9F-91D9-DBD32B716F9C}"/>
+          </ac:spMkLst>
+        </pc:spChg>
+      </pc:sldChg>
+      <pc:sldChg chg="addSp modSp mod setBg">
+        <pc:chgData name="Lee DongChan" userId="2351e7ecfaba754c" providerId="LiveId" clId="{CA37A7DB-0233-4F77-A408-1A694C71E128}" dt="2021-02-02T14:35:22.580" v="724" actId="403"/>
+        <pc:sldMkLst>
+          <pc:docMk/>
+          <pc:sldMk cId="2232539993" sldId="257"/>
+        </pc:sldMkLst>
+        <pc:spChg chg="add mod">
+          <ac:chgData name="Lee DongChan" userId="2351e7ecfaba754c" providerId="LiveId" clId="{CA37A7DB-0233-4F77-A408-1A694C71E128}" dt="2021-02-02T14:35:22.580" v="724" actId="403"/>
+          <ac:spMkLst>
+            <pc:docMk/>
+            <pc:sldMk cId="2232539993" sldId="257"/>
+            <ac:spMk id="2" creationId="{594CE94B-0E00-494A-BB22-DD8995331CC4}"/>
+          </ac:spMkLst>
+        </pc:spChg>
+      </pc:sldChg>
+      <pc:sldChg chg="addSp delSp modSp new mod setBg addCm delCm">
+        <pc:chgData name="Lee DongChan" userId="2351e7ecfaba754c" providerId="LiveId" clId="{CA37A7DB-0233-4F77-A408-1A694C71E128}" dt="2021-02-02T14:53:48.680" v="766" actId="692"/>
+        <pc:sldMkLst>
+          <pc:docMk/>
+          <pc:sldMk cId="2460629553" sldId="258"/>
+        </pc:sldMkLst>
+        <pc:spChg chg="del">
+          <ac:chgData name="Lee DongChan" userId="2351e7ecfaba754c" providerId="LiveId" clId="{CA37A7DB-0233-4F77-A408-1A694C71E128}" dt="2021-02-02T14:19:20.949" v="1" actId="478"/>
+          <ac:spMkLst>
+            <pc:docMk/>
+            <pc:sldMk cId="2460629553" sldId="258"/>
+            <ac:spMk id="2" creationId="{BB3B107E-AC6C-46E8-9D36-09D979E0C2AB}"/>
+          </ac:spMkLst>
+        </pc:spChg>
+        <pc:spChg chg="del">
+          <ac:chgData name="Lee DongChan" userId="2351e7ecfaba754c" providerId="LiveId" clId="{CA37A7DB-0233-4F77-A408-1A694C71E128}" dt="2021-02-02T14:19:21.986" v="2" actId="478"/>
+          <ac:spMkLst>
+            <pc:docMk/>
+            <pc:sldMk cId="2460629553" sldId="258"/>
+            <ac:spMk id="3" creationId="{32F9753E-7C50-4812-990F-0238D89C0ED4}"/>
+          </ac:spMkLst>
+        </pc:spChg>
+        <pc:spChg chg="add mod">
+          <ac:chgData name="Lee DongChan" userId="2351e7ecfaba754c" providerId="LiveId" clId="{CA37A7DB-0233-4F77-A408-1A694C71E128}" dt="2021-02-02T14:35:37.637" v="734" actId="1076"/>
+          <ac:spMkLst>
+            <pc:docMk/>
+            <pc:sldMk cId="2460629553" sldId="258"/>
+            <ac:spMk id="4" creationId="{F8641060-52CC-482F-B74D-6F6B307D9D0C}"/>
+          </ac:spMkLst>
+        </pc:spChg>
+        <pc:spChg chg="add mod">
+          <ac:chgData name="Lee DongChan" userId="2351e7ecfaba754c" providerId="LiveId" clId="{CA37A7DB-0233-4F77-A408-1A694C71E128}" dt="2021-02-02T14:35:37.637" v="734" actId="1076"/>
+          <ac:spMkLst>
+            <pc:docMk/>
+            <pc:sldMk cId="2460629553" sldId="258"/>
+            <ac:spMk id="5" creationId="{4DCFCE73-FF4A-486C-AF90-7B547377462E}"/>
+          </ac:spMkLst>
+        </pc:spChg>
+        <pc:spChg chg="add mod">
+          <ac:chgData name="Lee DongChan" userId="2351e7ecfaba754c" providerId="LiveId" clId="{CA37A7DB-0233-4F77-A408-1A694C71E128}" dt="2021-02-02T14:36:08.943" v="737" actId="207"/>
+          <ac:spMkLst>
+            <pc:docMk/>
+            <pc:sldMk cId="2460629553" sldId="258"/>
+            <ac:spMk id="8" creationId="{80968D8C-6036-4F02-AAE0-17DD66D50055}"/>
+          </ac:spMkLst>
+        </pc:spChg>
+        <pc:spChg chg="add mod">
+          <ac:chgData name="Lee DongChan" userId="2351e7ecfaba754c" providerId="LiveId" clId="{CA37A7DB-0233-4F77-A408-1A694C71E128}" dt="2021-02-02T14:36:08.943" v="737" actId="207"/>
+          <ac:spMkLst>
+            <pc:docMk/>
+            <pc:sldMk cId="2460629553" sldId="258"/>
+            <ac:spMk id="13" creationId="{605FA5F0-F8C2-4ED4-8F09-33D98946AD21}"/>
+          </ac:spMkLst>
+        </pc:spChg>
+        <pc:spChg chg="add del mod">
+          <ac:chgData name="Lee DongChan" userId="2351e7ecfaba754c" providerId="LiveId" clId="{CA37A7DB-0233-4F77-A408-1A694C71E128}" dt="2021-02-02T14:22:47.540" v="99"/>
+          <ac:spMkLst>
+            <pc:docMk/>
+            <pc:sldMk cId="2460629553" sldId="258"/>
+            <ac:spMk id="14" creationId="{E2F7F6AA-B555-45BC-A007-6EB84FDDBBBE}"/>
+          </ac:spMkLst>
+        </pc:spChg>
+        <pc:spChg chg="add mod">
+          <ac:chgData name="Lee DongChan" userId="2351e7ecfaba754c" providerId="LiveId" clId="{CA37A7DB-0233-4F77-A408-1A694C71E128}" dt="2021-02-02T14:36:20.445" v="749" actId="20577"/>
+          <ac:spMkLst>
+            <pc:docMk/>
+            <pc:sldMk cId="2460629553" sldId="258"/>
+            <ac:spMk id="15" creationId="{8A589FE8-C6F7-4825-B891-45B0820059EB}"/>
+          </ac:spMkLst>
+        </pc:spChg>
+        <pc:spChg chg="add mod">
+          <ac:chgData name="Lee DongChan" userId="2351e7ecfaba754c" providerId="LiveId" clId="{CA37A7DB-0233-4F77-A408-1A694C71E128}" dt="2021-02-02T14:35:44.576" v="735" actId="207"/>
+          <ac:spMkLst>
+            <pc:docMk/>
+            <pc:sldMk cId="2460629553" sldId="258"/>
+            <ac:spMk id="16" creationId="{7BCFF158-250D-4C50-86F8-D0D479B8868D}"/>
+          </ac:spMkLst>
+        </pc:spChg>
+        <pc:spChg chg="add mod">
+          <ac:chgData name="Lee DongChan" userId="2351e7ecfaba754c" providerId="LiveId" clId="{CA37A7DB-0233-4F77-A408-1A694C71E128}" dt="2021-02-02T14:35:37.637" v="734" actId="1076"/>
+          <ac:spMkLst>
+            <pc:docMk/>
+            <pc:sldMk cId="2460629553" sldId="258"/>
+            <ac:spMk id="17" creationId="{D4AAC578-2746-415B-A166-1E5D363135F1}"/>
+          </ac:spMkLst>
+        </pc:spChg>
+        <pc:spChg chg="add mod">
+          <ac:chgData name="Lee DongChan" userId="2351e7ecfaba754c" providerId="LiveId" clId="{CA37A7DB-0233-4F77-A408-1A694C71E128}" dt="2021-02-02T14:35:37.637" v="734" actId="1076"/>
+          <ac:spMkLst>
+            <pc:docMk/>
+            <pc:sldMk cId="2460629553" sldId="258"/>
+            <ac:spMk id="18" creationId="{E303F3AE-FF6D-4298-86F9-650F4139CD8A}"/>
+          </ac:spMkLst>
+        </pc:spChg>
+        <pc:spChg chg="add mod">
+          <ac:chgData name="Lee DongChan" userId="2351e7ecfaba754c" providerId="LiveId" clId="{CA37A7DB-0233-4F77-A408-1A694C71E128}" dt="2021-02-02T14:35:37.637" v="734" actId="1076"/>
+          <ac:spMkLst>
+            <pc:docMk/>
+            <pc:sldMk cId="2460629553" sldId="258"/>
+            <ac:spMk id="23" creationId="{6CBC75D2-AF36-4933-A70E-3B3E97709228}"/>
+          </ac:spMkLst>
+        </pc:spChg>
+        <pc:spChg chg="add mod">
+          <ac:chgData name="Lee DongChan" userId="2351e7ecfaba754c" providerId="LiveId" clId="{CA37A7DB-0233-4F77-A408-1A694C71E128}" dt="2021-02-02T14:53:21.609" v="760" actId="1076"/>
+          <ac:spMkLst>
+            <pc:docMk/>
+            <pc:sldMk cId="2460629553" sldId="258"/>
+            <ac:spMk id="32" creationId="{C1EA8E91-3C03-456B-9037-E57C9073BAFE}"/>
+          </ac:spMkLst>
+        </pc:spChg>
+        <pc:spChg chg="add mod">
+          <ac:chgData name="Lee DongChan" userId="2351e7ecfaba754c" providerId="LiveId" clId="{CA37A7DB-0233-4F77-A408-1A694C71E128}" dt="2021-02-02T14:35:37.637" v="734" actId="1076"/>
+          <ac:spMkLst>
+            <pc:docMk/>
+            <pc:sldMk cId="2460629553" sldId="258"/>
+            <ac:spMk id="37" creationId="{3F611FAA-6D5E-441F-B480-6BD0797F4E75}"/>
+          </ac:spMkLst>
+        </pc:spChg>
+        <pc:spChg chg="add mod">
+          <ac:chgData name="Lee DongChan" userId="2351e7ecfaba754c" providerId="LiveId" clId="{CA37A7DB-0233-4F77-A408-1A694C71E128}" dt="2021-02-02T14:35:37.637" v="734" actId="1076"/>
+          <ac:spMkLst>
+            <pc:docMk/>
+            <pc:sldMk cId="2460629553" sldId="258"/>
+            <ac:spMk id="38" creationId="{CF0C4323-7F0A-4560-94A4-17BC4FCA3CFD}"/>
+          </ac:spMkLst>
+        </pc:spChg>
+        <pc:spChg chg="add mod">
+          <ac:chgData name="Lee DongChan" userId="2351e7ecfaba754c" providerId="LiveId" clId="{CA37A7DB-0233-4F77-A408-1A694C71E128}" dt="2021-02-02T14:53:23.391" v="761" actId="1076"/>
+          <ac:spMkLst>
+            <pc:docMk/>
+            <pc:sldMk cId="2460629553" sldId="258"/>
+            <ac:spMk id="49" creationId="{36E0198B-4260-4A9D-995E-71E24850C168}"/>
+          </ac:spMkLst>
+        </pc:spChg>
+        <pc:cxnChg chg="add mod">
+          <ac:chgData name="Lee DongChan" userId="2351e7ecfaba754c" providerId="LiveId" clId="{CA37A7DB-0233-4F77-A408-1A694C71E128}" dt="2021-02-02T14:36:04.575" v="736" actId="692"/>
+          <ac:cxnSpMkLst>
+            <pc:docMk/>
+            <pc:sldMk cId="2460629553" sldId="258"/>
+            <ac:cxnSpMk id="7" creationId="{B873BA2A-BE52-4EDA-AFAF-55C8EE00A3EE}"/>
+          </ac:cxnSpMkLst>
+        </pc:cxnChg>
+        <pc:cxnChg chg="add mod">
+          <ac:chgData name="Lee DongChan" userId="2351e7ecfaba754c" providerId="LiveId" clId="{CA37A7DB-0233-4F77-A408-1A694C71E128}" dt="2021-02-02T14:36:04.575" v="736" actId="692"/>
+          <ac:cxnSpMkLst>
+            <pc:docMk/>
+            <pc:sldMk cId="2460629553" sldId="258"/>
+            <ac:cxnSpMk id="9" creationId="{6817BC62-783F-40CF-B6A7-ABA68C0163C5}"/>
+          </ac:cxnSpMkLst>
+        </pc:cxnChg>
+        <pc:cxnChg chg="add mod">
+          <ac:chgData name="Lee DongChan" userId="2351e7ecfaba754c" providerId="LiveId" clId="{CA37A7DB-0233-4F77-A408-1A694C71E128}" dt="2021-02-02T14:36:04.575" v="736" actId="692"/>
+          <ac:cxnSpMkLst>
+            <pc:docMk/>
+            <pc:sldMk cId="2460629553" sldId="258"/>
+            <ac:cxnSpMk id="20" creationId="{25DF555B-AE52-4720-806D-CA28CD8E1FC3}"/>
+          </ac:cxnSpMkLst>
+        </pc:cxnChg>
+        <pc:cxnChg chg="add mod">
+          <ac:chgData name="Lee DongChan" userId="2351e7ecfaba754c" providerId="LiveId" clId="{CA37A7DB-0233-4F77-A408-1A694C71E128}" dt="2021-02-02T14:36:04.575" v="736" actId="692"/>
+          <ac:cxnSpMkLst>
+            <pc:docMk/>
+            <pc:sldMk cId="2460629553" sldId="258"/>
+            <ac:cxnSpMk id="22" creationId="{992B376D-BD04-42B1-817B-C82BEC667CEF}"/>
+          </ac:cxnSpMkLst>
+        </pc:cxnChg>
+        <pc:cxnChg chg="add mod">
+          <ac:chgData name="Lee DongChan" userId="2351e7ecfaba754c" providerId="LiveId" clId="{CA37A7DB-0233-4F77-A408-1A694C71E128}" dt="2021-02-02T14:36:04.575" v="736" actId="692"/>
+          <ac:cxnSpMkLst>
+            <pc:docMk/>
+            <pc:sldMk cId="2460629553" sldId="258"/>
+            <ac:cxnSpMk id="25" creationId="{3A585EE5-BE6E-4E6E-AD7C-1D53715E26EC}"/>
+          </ac:cxnSpMkLst>
+        </pc:cxnChg>
+        <pc:cxnChg chg="add mod">
+          <ac:chgData name="Lee DongChan" userId="2351e7ecfaba754c" providerId="LiveId" clId="{CA37A7DB-0233-4F77-A408-1A694C71E128}" dt="2021-02-02T14:36:04.575" v="736" actId="692"/>
+          <ac:cxnSpMkLst>
+            <pc:docMk/>
+            <pc:sldMk cId="2460629553" sldId="258"/>
+            <ac:cxnSpMk id="27" creationId="{A67E9745-EBCF-4139-9024-7FD32F222EC0}"/>
+          </ac:cxnSpMkLst>
+        </pc:cxnChg>
+        <pc:cxnChg chg="add mod">
+          <ac:chgData name="Lee DongChan" userId="2351e7ecfaba754c" providerId="LiveId" clId="{CA37A7DB-0233-4F77-A408-1A694C71E128}" dt="2021-02-02T14:36:04.575" v="736" actId="692"/>
+          <ac:cxnSpMkLst>
+            <pc:docMk/>
+            <pc:sldMk cId="2460629553" sldId="258"/>
+            <ac:cxnSpMk id="29" creationId="{2E6E5F8D-F920-4061-A906-A80A9C4E1247}"/>
+          </ac:cxnSpMkLst>
+        </pc:cxnChg>
+        <pc:cxnChg chg="add mod">
+          <ac:chgData name="Lee DongChan" userId="2351e7ecfaba754c" providerId="LiveId" clId="{CA37A7DB-0233-4F77-A408-1A694C71E128}" dt="2021-02-02T14:36:04.575" v="736" actId="692"/>
+          <ac:cxnSpMkLst>
+            <pc:docMk/>
+            <pc:sldMk cId="2460629553" sldId="258"/>
+            <ac:cxnSpMk id="31" creationId="{E143D1A3-BDBB-42D8-B245-FC7D42BD0A1A}"/>
+          </ac:cxnSpMkLst>
+        </pc:cxnChg>
+        <pc:cxnChg chg="add mod">
+          <ac:chgData name="Lee DongChan" userId="2351e7ecfaba754c" providerId="LiveId" clId="{CA37A7DB-0233-4F77-A408-1A694C71E128}" dt="2021-02-02T14:53:21.609" v="760" actId="1076"/>
+          <ac:cxnSpMkLst>
+            <pc:docMk/>
+            <pc:sldMk cId="2460629553" sldId="258"/>
+            <ac:cxnSpMk id="34" creationId="{CB0DE129-F8AB-4779-8ECA-79F73D1D9CE0}"/>
+          </ac:cxnSpMkLst>
+        </pc:cxnChg>
+        <pc:cxnChg chg="add mod">
+          <ac:chgData name="Lee DongChan" userId="2351e7ecfaba754c" providerId="LiveId" clId="{CA37A7DB-0233-4F77-A408-1A694C71E128}" dt="2021-02-02T14:53:21.609" v="760" actId="1076"/>
+          <ac:cxnSpMkLst>
+            <pc:docMk/>
+            <pc:sldMk cId="2460629553" sldId="258"/>
+            <ac:cxnSpMk id="36" creationId="{939B903E-136A-464F-BC32-8B4C5C95C48F}"/>
+          </ac:cxnSpMkLst>
+        </pc:cxnChg>
+        <pc:cxnChg chg="add mod">
+          <ac:chgData name="Lee DongChan" userId="2351e7ecfaba754c" providerId="LiveId" clId="{CA37A7DB-0233-4F77-A408-1A694C71E128}" dt="2021-02-02T14:36:04.575" v="736" actId="692"/>
+          <ac:cxnSpMkLst>
+            <pc:docMk/>
+            <pc:sldMk cId="2460629553" sldId="258"/>
+            <ac:cxnSpMk id="40" creationId="{FC85E2B6-0452-458A-A366-207FDC08E355}"/>
+          </ac:cxnSpMkLst>
+        </pc:cxnChg>
+        <pc:cxnChg chg="add mod">
+          <ac:chgData name="Lee DongChan" userId="2351e7ecfaba754c" providerId="LiveId" clId="{CA37A7DB-0233-4F77-A408-1A694C71E128}" dt="2021-02-02T14:36:04.575" v="736" actId="692"/>
+          <ac:cxnSpMkLst>
+            <pc:docMk/>
+            <pc:sldMk cId="2460629553" sldId="258"/>
+            <ac:cxnSpMk id="42" creationId="{8E968767-A43D-4F33-BA3C-942196FC0A82}"/>
+          </ac:cxnSpMkLst>
+        </pc:cxnChg>
+        <pc:cxnChg chg="add mod">
+          <ac:chgData name="Lee DongChan" userId="2351e7ecfaba754c" providerId="LiveId" clId="{CA37A7DB-0233-4F77-A408-1A694C71E128}" dt="2021-02-02T14:36:04.575" v="736" actId="692"/>
+          <ac:cxnSpMkLst>
+            <pc:docMk/>
+            <pc:sldMk cId="2460629553" sldId="258"/>
+            <ac:cxnSpMk id="44" creationId="{06090A9E-FDFE-4B11-B0C4-B43395FCB0D6}"/>
+          </ac:cxnSpMkLst>
+        </pc:cxnChg>
+        <pc:cxnChg chg="add mod">
+          <ac:chgData name="Lee DongChan" userId="2351e7ecfaba754c" providerId="LiveId" clId="{CA37A7DB-0233-4F77-A408-1A694C71E128}" dt="2021-02-02T14:36:04.575" v="736" actId="692"/>
+          <ac:cxnSpMkLst>
+            <pc:docMk/>
+            <pc:sldMk cId="2460629553" sldId="258"/>
+            <ac:cxnSpMk id="46" creationId="{A457A89B-41C0-4CFB-B39E-884067D04478}"/>
+          </ac:cxnSpMkLst>
+        </pc:cxnChg>
+        <pc:cxnChg chg="add del mod">
+          <ac:chgData name="Lee DongChan" userId="2351e7ecfaba754c" providerId="LiveId" clId="{CA37A7DB-0233-4F77-A408-1A694C71E128}" dt="2021-02-02T14:53:33.189" v="763" actId="11529"/>
+          <ac:cxnSpMkLst>
+            <pc:docMk/>
+            <pc:sldMk cId="2460629553" sldId="258"/>
+            <ac:cxnSpMk id="51" creationId="{D36D7A29-04CB-4805-A8A5-66E8F2FFFDCB}"/>
+          </ac:cxnSpMkLst>
+        </pc:cxnChg>
+        <pc:cxnChg chg="add mod">
+          <ac:chgData name="Lee DongChan" userId="2351e7ecfaba754c" providerId="LiveId" clId="{CA37A7DB-0233-4F77-A408-1A694C71E128}" dt="2021-02-02T14:53:48.680" v="766" actId="692"/>
+          <ac:cxnSpMkLst>
+            <pc:docMk/>
+            <pc:sldMk cId="2460629553" sldId="258"/>
+            <ac:cxnSpMk id="53" creationId="{FF36493C-BAC7-4BDD-A168-758FEF65FB6E}"/>
+          </ac:cxnSpMkLst>
+        </pc:cxnChg>
+        <pc:cxnChg chg="add mod">
+          <ac:chgData name="Lee DongChan" userId="2351e7ecfaba754c" providerId="LiveId" clId="{CA37A7DB-0233-4F77-A408-1A694C71E128}" dt="2021-02-02T14:53:48.680" v="766" actId="692"/>
+          <ac:cxnSpMkLst>
+            <pc:docMk/>
+            <pc:sldMk cId="2460629553" sldId="258"/>
+            <ac:cxnSpMk id="55" creationId="{07A110D0-F41F-4FD3-BF10-EC7DC90B5C7F}"/>
+          </ac:cxnSpMkLst>
+        </pc:cxnChg>
+      </pc:sldChg>
+    </pc:docChg>
+  </pc:docChgLst>
+</pc:chgInfo>
 </file>
 
 <file path=ppt/slideLayouts/slideLayout1.xml><?xml version="1.0" encoding="utf-8"?>
@@ -267,7 +599,7 @@
           <a:p>
             <a:fld id="{27317AE2-C64D-41B2-B41A-614EA8E73B27}" type="datetimeFigureOut">
               <a:rPr lang="ko-KR" altLang="en-US" smtClean="0"/>
-              <a:t>2020-12-14</a:t>
+              <a:t>2021-02-07</a:t>
             </a:fld>
             <a:endParaRPr lang="ko-KR" altLang="en-US"/>
           </a:p>
@@ -465,7 +797,7 @@
           <a:p>
             <a:fld id="{27317AE2-C64D-41B2-B41A-614EA8E73B27}" type="datetimeFigureOut">
               <a:rPr lang="ko-KR" altLang="en-US" smtClean="0"/>
-              <a:t>2020-12-14</a:t>
+              <a:t>2021-02-07</a:t>
             </a:fld>
             <a:endParaRPr lang="ko-KR" altLang="en-US"/>
           </a:p>
@@ -673,7 +1005,7 @@
           <a:p>
             <a:fld id="{27317AE2-C64D-41B2-B41A-614EA8E73B27}" type="datetimeFigureOut">
               <a:rPr lang="ko-KR" altLang="en-US" smtClean="0"/>
-              <a:t>2020-12-14</a:t>
+              <a:t>2021-02-07</a:t>
             </a:fld>
             <a:endParaRPr lang="ko-KR" altLang="en-US"/>
           </a:p>
@@ -871,7 +1203,7 @@
           <a:p>
             <a:fld id="{27317AE2-C64D-41B2-B41A-614EA8E73B27}" type="datetimeFigureOut">
               <a:rPr lang="ko-KR" altLang="en-US" smtClean="0"/>
-              <a:t>2020-12-14</a:t>
+              <a:t>2021-02-07</a:t>
             </a:fld>
             <a:endParaRPr lang="ko-KR" altLang="en-US"/>
           </a:p>
@@ -1146,7 +1478,7 @@
           <a:p>
             <a:fld id="{27317AE2-C64D-41B2-B41A-614EA8E73B27}" type="datetimeFigureOut">
               <a:rPr lang="ko-KR" altLang="en-US" smtClean="0"/>
-              <a:t>2020-12-14</a:t>
+              <a:t>2021-02-07</a:t>
             </a:fld>
             <a:endParaRPr lang="ko-KR" altLang="en-US"/>
           </a:p>
@@ -1411,7 +1743,7 @@
           <a:p>
             <a:fld id="{27317AE2-C64D-41B2-B41A-614EA8E73B27}" type="datetimeFigureOut">
               <a:rPr lang="ko-KR" altLang="en-US" smtClean="0"/>
-              <a:t>2020-12-14</a:t>
+              <a:t>2021-02-07</a:t>
             </a:fld>
             <a:endParaRPr lang="ko-KR" altLang="en-US"/>
           </a:p>
@@ -1823,7 +2155,7 @@
           <a:p>
             <a:fld id="{27317AE2-C64D-41B2-B41A-614EA8E73B27}" type="datetimeFigureOut">
               <a:rPr lang="ko-KR" altLang="en-US" smtClean="0"/>
-              <a:t>2020-12-14</a:t>
+              <a:t>2021-02-07</a:t>
             </a:fld>
             <a:endParaRPr lang="ko-KR" altLang="en-US"/>
           </a:p>
@@ -1964,7 +2296,7 @@
           <a:p>
             <a:fld id="{27317AE2-C64D-41B2-B41A-614EA8E73B27}" type="datetimeFigureOut">
               <a:rPr lang="ko-KR" altLang="en-US" smtClean="0"/>
-              <a:t>2020-12-14</a:t>
+              <a:t>2021-02-07</a:t>
             </a:fld>
             <a:endParaRPr lang="ko-KR" altLang="en-US"/>
           </a:p>
@@ -2077,7 +2409,7 @@
           <a:p>
             <a:fld id="{27317AE2-C64D-41B2-B41A-614EA8E73B27}" type="datetimeFigureOut">
               <a:rPr lang="ko-KR" altLang="en-US" smtClean="0"/>
-              <a:t>2020-12-14</a:t>
+              <a:t>2021-02-07</a:t>
             </a:fld>
             <a:endParaRPr lang="ko-KR" altLang="en-US"/>
           </a:p>
@@ -2388,7 +2720,7 @@
           <a:p>
             <a:fld id="{27317AE2-C64D-41B2-B41A-614EA8E73B27}" type="datetimeFigureOut">
               <a:rPr lang="ko-KR" altLang="en-US" smtClean="0"/>
-              <a:t>2020-12-14</a:t>
+              <a:t>2021-02-07</a:t>
             </a:fld>
             <a:endParaRPr lang="ko-KR" altLang="en-US"/>
           </a:p>
@@ -2676,7 +3008,7 @@
           <a:p>
             <a:fld id="{27317AE2-C64D-41B2-B41A-614EA8E73B27}" type="datetimeFigureOut">
               <a:rPr lang="ko-KR" altLang="en-US" smtClean="0"/>
-              <a:t>2020-12-14</a:t>
+              <a:t>2021-02-07</a:t>
             </a:fld>
             <a:endParaRPr lang="ko-KR" altLang="en-US"/>
           </a:p>
@@ -2917,7 +3249,7 @@
           <a:p>
             <a:fld id="{27317AE2-C64D-41B2-B41A-614EA8E73B27}" type="datetimeFigureOut">
               <a:rPr lang="ko-KR" altLang="en-US" smtClean="0"/>
-              <a:t>2020-12-14</a:t>
+              <a:t>2021-02-07</a:t>
             </a:fld>
             <a:endParaRPr lang="ko-KR" altLang="en-US"/>
           </a:p>
@@ -3320,6 +3652,14 @@
 <file path=ppt/slides/slide1.xml><?xml version="1.0" encoding="utf-8"?>
 <p:sld xmlns:a="http://schemas.openxmlformats.org/drawingml/2006/main" xmlns:r="http://schemas.openxmlformats.org/officeDocument/2006/relationships" xmlns:p="http://schemas.openxmlformats.org/presentationml/2006/main">
   <p:cSld>
+    <p:bg>
+      <p:bgPr>
+        <a:solidFill>
+          <a:srgbClr val="24292E"/>
+        </a:solidFill>
+        <a:effectLst/>
+      </p:bgPr>
+    </p:bg>
     <p:spTree>
       <p:nvGrpSpPr>
         <p:cNvPr id="1" name=""/>
@@ -3356,10 +3696,18 @@
           <a:lstStyle/>
           <a:p>
             <a:r>
-              <a:rPr lang="en-US" altLang="ko-KR" dirty="0"/>
+              <a:rPr lang="en-US" altLang="ko-KR" dirty="0">
+                <a:solidFill>
+                  <a:schemeClr val="bg1"/>
+                </a:solidFill>
+              </a:rPr>
               <a:t>architecture</a:t>
             </a:r>
-            <a:endParaRPr lang="ko-KR" altLang="en-US" dirty="0"/>
+            <a:endParaRPr lang="ko-KR" altLang="en-US" dirty="0">
+              <a:solidFill>
+                <a:schemeClr val="bg1"/>
+              </a:solidFill>
+            </a:endParaRPr>
           </a:p>
         </p:txBody>
       </p:sp>
@@ -3379,6 +3727,14 @@
 <file path=ppt/slides/slide2.xml><?xml version="1.0" encoding="utf-8"?>
 <p:sld xmlns:a="http://schemas.openxmlformats.org/drawingml/2006/main" xmlns:r="http://schemas.openxmlformats.org/officeDocument/2006/relationships" xmlns:p="http://schemas.openxmlformats.org/presentationml/2006/main">
   <p:cSld>
+    <p:bg>
+      <p:bgPr>
+        <a:solidFill>
+          <a:srgbClr val="24292E"/>
+        </a:solidFill>
+        <a:effectLst/>
+      </p:bgPr>
+    </p:bg>
     <p:spTree>
       <p:nvGrpSpPr>
         <p:cNvPr id="1" name=""/>
@@ -4878,10 +5234,1247 @@
           </a:p>
         </p:txBody>
       </p:sp>
+      <p:sp>
+        <p:nvSpPr>
+          <p:cNvPr id="2" name="TextBox 1">
+            <a:extLst>
+              <a:ext uri="{FF2B5EF4-FFF2-40B4-BE49-F238E27FC236}">
+                <a16:creationId xmlns:a16="http://schemas.microsoft.com/office/drawing/2014/main" id="{594CE94B-0E00-494A-BB22-DD8995331CC4}"/>
+              </a:ext>
+            </a:extLst>
+          </p:cNvPr>
+          <p:cNvSpPr txBox="1"/>
+          <p:nvPr/>
+        </p:nvSpPr>
+        <p:spPr>
+          <a:xfrm>
+            <a:off x="3601616" y="261257"/>
+            <a:ext cx="4823927" cy="584775"/>
+          </a:xfrm>
+          <a:prstGeom prst="rect">
+            <a:avLst/>
+          </a:prstGeom>
+          <a:noFill/>
+        </p:spPr>
+        <p:txBody>
+          <a:bodyPr wrap="square" rtlCol="0">
+            <a:spAutoFit/>
+          </a:bodyPr>
+          <a:lstStyle/>
+          <a:p>
+            <a:pPr algn="ctr"/>
+            <a:r>
+              <a:rPr lang="en-US" altLang="ko-KR" sz="3200" dirty="0">
+                <a:solidFill>
+                  <a:schemeClr val="bg1"/>
+                </a:solidFill>
+              </a:rPr>
+              <a:t>Basic structure</a:t>
+            </a:r>
+            <a:endParaRPr lang="ko-KR" altLang="en-US" sz="3200" dirty="0">
+              <a:solidFill>
+                <a:schemeClr val="bg1"/>
+              </a:solidFill>
+            </a:endParaRPr>
+          </a:p>
+        </p:txBody>
+      </p:sp>
     </p:spTree>
     <p:extLst>
       <p:ext uri="{BB962C8B-B14F-4D97-AF65-F5344CB8AC3E}">
         <p14:creationId xmlns:p14="http://schemas.microsoft.com/office/powerpoint/2010/main" val="2232539993"/>
+      </p:ext>
+    </p:extLst>
+  </p:cSld>
+  <p:clrMapOvr>
+    <a:masterClrMapping/>
+  </p:clrMapOvr>
+</p:sld>
+</file>
+
+<file path=ppt/slides/slide3.xml><?xml version="1.0" encoding="utf-8"?>
+<p:sld xmlns:a="http://schemas.openxmlformats.org/drawingml/2006/main" xmlns:r="http://schemas.openxmlformats.org/officeDocument/2006/relationships" xmlns:p="http://schemas.openxmlformats.org/presentationml/2006/main">
+  <p:cSld>
+    <p:bg>
+      <p:bgPr>
+        <a:solidFill>
+          <a:srgbClr val="24292E"/>
+        </a:solidFill>
+        <a:effectLst/>
+      </p:bgPr>
+    </p:bg>
+    <p:spTree>
+      <p:nvGrpSpPr>
+        <p:cNvPr id="1" name=""/>
+        <p:cNvGrpSpPr/>
+        <p:nvPr/>
+      </p:nvGrpSpPr>
+      <p:grpSpPr>
+        <a:xfrm>
+          <a:off x="0" y="0"/>
+          <a:ext cx="0" cy="0"/>
+          <a:chOff x="0" y="0"/>
+          <a:chExt cx="0" cy="0"/>
+        </a:xfrm>
+      </p:grpSpPr>
+      <p:sp>
+        <p:nvSpPr>
+          <p:cNvPr id="4" name="직사각형 3">
+            <a:extLst>
+              <a:ext uri="{FF2B5EF4-FFF2-40B4-BE49-F238E27FC236}">
+                <a16:creationId xmlns:a16="http://schemas.microsoft.com/office/drawing/2014/main" id="{F8641060-52CC-482F-B74D-6F6B307D9D0C}"/>
+              </a:ext>
+            </a:extLst>
+          </p:cNvPr>
+          <p:cNvSpPr/>
+          <p:nvPr/>
+        </p:nvSpPr>
+        <p:spPr>
+          <a:xfrm>
+            <a:off x="663843" y="3512975"/>
+            <a:ext cx="1325461" cy="914400"/>
+          </a:xfrm>
+          <a:prstGeom prst="rect">
+            <a:avLst/>
+          </a:prstGeom>
+        </p:spPr>
+        <p:style>
+          <a:lnRef idx="2">
+            <a:schemeClr val="accent1">
+              <a:shade val="50000"/>
+            </a:schemeClr>
+          </a:lnRef>
+          <a:fillRef idx="1">
+            <a:schemeClr val="accent1"/>
+          </a:fillRef>
+          <a:effectRef idx="0">
+            <a:schemeClr val="accent1"/>
+          </a:effectRef>
+          <a:fontRef idx="minor">
+            <a:schemeClr val="lt1"/>
+          </a:fontRef>
+        </p:style>
+        <p:txBody>
+          <a:bodyPr rtlCol="0" anchor="ctr"/>
+          <a:lstStyle/>
+          <a:p>
+            <a:pPr algn="ctr"/>
+            <a:r>
+              <a:rPr lang="en-US" altLang="ko-KR" dirty="0"/>
+              <a:t>CLIENT</a:t>
+            </a:r>
+            <a:endParaRPr lang="ko-KR" altLang="en-US" dirty="0"/>
+          </a:p>
+        </p:txBody>
+      </p:sp>
+      <p:sp>
+        <p:nvSpPr>
+          <p:cNvPr id="5" name="직사각형 4">
+            <a:extLst>
+              <a:ext uri="{FF2B5EF4-FFF2-40B4-BE49-F238E27FC236}">
+                <a16:creationId xmlns:a16="http://schemas.microsoft.com/office/drawing/2014/main" id="{4DCFCE73-FF4A-486C-AF90-7B547377462E}"/>
+              </a:ext>
+            </a:extLst>
+          </p:cNvPr>
+          <p:cNvSpPr/>
+          <p:nvPr/>
+        </p:nvSpPr>
+        <p:spPr>
+          <a:xfrm>
+            <a:off x="3222487" y="1973595"/>
+            <a:ext cx="1073790" cy="3993160"/>
+          </a:xfrm>
+          <a:prstGeom prst="rect">
+            <a:avLst/>
+          </a:prstGeom>
+        </p:spPr>
+        <p:style>
+          <a:lnRef idx="2">
+            <a:schemeClr val="accent1">
+              <a:shade val="50000"/>
+            </a:schemeClr>
+          </a:lnRef>
+          <a:fillRef idx="1">
+            <a:schemeClr val="accent1"/>
+          </a:fillRef>
+          <a:effectRef idx="0">
+            <a:schemeClr val="accent1"/>
+          </a:effectRef>
+          <a:fontRef idx="minor">
+            <a:schemeClr val="lt1"/>
+          </a:fontRef>
+        </p:style>
+        <p:txBody>
+          <a:bodyPr rtlCol="0" anchor="ctr"/>
+          <a:lstStyle/>
+          <a:p>
+            <a:pPr algn="ctr"/>
+            <a:r>
+              <a:rPr lang="en-US" altLang="ko-KR" dirty="0"/>
+              <a:t>API</a:t>
+            </a:r>
+            <a:br>
+              <a:rPr lang="en-US" altLang="ko-KR" dirty="0"/>
+            </a:br>
+            <a:r>
+              <a:rPr lang="en-US" altLang="ko-KR" dirty="0"/>
+              <a:t>gateway</a:t>
+            </a:r>
+            <a:endParaRPr lang="ko-KR" altLang="en-US" dirty="0"/>
+          </a:p>
+        </p:txBody>
+      </p:sp>
+      <p:cxnSp>
+        <p:nvCxnSpPr>
+          <p:cNvPr id="7" name="직선 화살표 연결선 6">
+            <a:extLst>
+              <a:ext uri="{FF2B5EF4-FFF2-40B4-BE49-F238E27FC236}">
+                <a16:creationId xmlns:a16="http://schemas.microsoft.com/office/drawing/2014/main" id="{B873BA2A-BE52-4EDA-AFAF-55C8EE00A3EE}"/>
+              </a:ext>
+            </a:extLst>
+          </p:cNvPr>
+          <p:cNvCxnSpPr/>
+          <p:nvPr/>
+        </p:nvCxnSpPr>
+        <p:spPr>
+          <a:xfrm>
+            <a:off x="1989304" y="3720603"/>
+            <a:ext cx="1249960" cy="0"/>
+          </a:xfrm>
+          <a:prstGeom prst="straightConnector1">
+            <a:avLst/>
+          </a:prstGeom>
+          <a:ln>
+            <a:solidFill>
+              <a:schemeClr val="bg1"/>
+            </a:solidFill>
+            <a:tailEnd type="triangle"/>
+          </a:ln>
+        </p:spPr>
+        <p:style>
+          <a:lnRef idx="1">
+            <a:schemeClr val="accent1"/>
+          </a:lnRef>
+          <a:fillRef idx="0">
+            <a:schemeClr val="accent1"/>
+          </a:fillRef>
+          <a:effectRef idx="0">
+            <a:schemeClr val="accent1"/>
+          </a:effectRef>
+          <a:fontRef idx="minor">
+            <a:schemeClr val="tx1"/>
+          </a:fontRef>
+        </p:style>
+      </p:cxnSp>
+      <p:sp>
+        <p:nvSpPr>
+          <p:cNvPr id="8" name="TextBox 7">
+            <a:extLst>
+              <a:ext uri="{FF2B5EF4-FFF2-40B4-BE49-F238E27FC236}">
+                <a16:creationId xmlns:a16="http://schemas.microsoft.com/office/drawing/2014/main" id="{80968D8C-6036-4F02-AAE0-17DD66D50055}"/>
+              </a:ext>
+            </a:extLst>
+          </p:cNvPr>
+          <p:cNvSpPr txBox="1"/>
+          <p:nvPr/>
+        </p:nvSpPr>
+        <p:spPr>
+          <a:xfrm>
+            <a:off x="2320670" y="3505159"/>
+            <a:ext cx="557868" cy="215444"/>
+          </a:xfrm>
+          <a:prstGeom prst="rect">
+            <a:avLst/>
+          </a:prstGeom>
+          <a:noFill/>
+        </p:spPr>
+        <p:txBody>
+          <a:bodyPr wrap="square" rtlCol="0">
+            <a:spAutoFit/>
+          </a:bodyPr>
+          <a:lstStyle/>
+          <a:p>
+            <a:r>
+              <a:rPr lang="en-US" altLang="ko-KR" sz="800" dirty="0">
+                <a:solidFill>
+                  <a:schemeClr val="bg1"/>
+                </a:solidFill>
+              </a:rPr>
+              <a:t>request</a:t>
+            </a:r>
+            <a:endParaRPr lang="ko-KR" altLang="en-US" sz="800" dirty="0">
+              <a:solidFill>
+                <a:schemeClr val="bg1"/>
+              </a:solidFill>
+            </a:endParaRPr>
+          </a:p>
+        </p:txBody>
+      </p:sp>
+      <p:cxnSp>
+        <p:nvCxnSpPr>
+          <p:cNvPr id="9" name="직선 화살표 연결선 8">
+            <a:extLst>
+              <a:ext uri="{FF2B5EF4-FFF2-40B4-BE49-F238E27FC236}">
+                <a16:creationId xmlns:a16="http://schemas.microsoft.com/office/drawing/2014/main" id="{6817BC62-783F-40CF-B6A7-ABA68C0163C5}"/>
+              </a:ext>
+            </a:extLst>
+          </p:cNvPr>
+          <p:cNvCxnSpPr>
+            <a:cxnSpLocks/>
+          </p:cNvCxnSpPr>
+          <p:nvPr/>
+        </p:nvCxnSpPr>
+        <p:spPr>
+          <a:xfrm flipH="1">
+            <a:off x="1989304" y="4219747"/>
+            <a:ext cx="1233182" cy="0"/>
+          </a:xfrm>
+          <a:prstGeom prst="straightConnector1">
+            <a:avLst/>
+          </a:prstGeom>
+          <a:ln>
+            <a:solidFill>
+              <a:schemeClr val="bg1"/>
+            </a:solidFill>
+            <a:tailEnd type="triangle"/>
+          </a:ln>
+        </p:spPr>
+        <p:style>
+          <a:lnRef idx="1">
+            <a:schemeClr val="accent1"/>
+          </a:lnRef>
+          <a:fillRef idx="0">
+            <a:schemeClr val="accent1"/>
+          </a:fillRef>
+          <a:effectRef idx="0">
+            <a:schemeClr val="accent1"/>
+          </a:effectRef>
+          <a:fontRef idx="minor">
+            <a:schemeClr val="tx1"/>
+          </a:fontRef>
+        </p:style>
+      </p:cxnSp>
+      <p:sp>
+        <p:nvSpPr>
+          <p:cNvPr id="13" name="TextBox 12">
+            <a:extLst>
+              <a:ext uri="{FF2B5EF4-FFF2-40B4-BE49-F238E27FC236}">
+                <a16:creationId xmlns:a16="http://schemas.microsoft.com/office/drawing/2014/main" id="{605FA5F0-F8C2-4ED4-8F09-33D98946AD21}"/>
+              </a:ext>
+            </a:extLst>
+          </p:cNvPr>
+          <p:cNvSpPr txBox="1"/>
+          <p:nvPr/>
+        </p:nvSpPr>
+        <p:spPr>
+          <a:xfrm>
+            <a:off x="2320669" y="4004303"/>
+            <a:ext cx="641757" cy="215444"/>
+          </a:xfrm>
+          <a:prstGeom prst="rect">
+            <a:avLst/>
+          </a:prstGeom>
+          <a:noFill/>
+        </p:spPr>
+        <p:txBody>
+          <a:bodyPr wrap="square" rtlCol="0">
+            <a:spAutoFit/>
+          </a:bodyPr>
+          <a:lstStyle/>
+          <a:p>
+            <a:r>
+              <a:rPr lang="en-US" altLang="ko-KR" sz="800" dirty="0">
+                <a:solidFill>
+                  <a:schemeClr val="bg1"/>
+                </a:solidFill>
+              </a:rPr>
+              <a:t>response</a:t>
+            </a:r>
+            <a:endParaRPr lang="ko-KR" altLang="en-US" sz="800" dirty="0">
+              <a:solidFill>
+                <a:schemeClr val="bg1"/>
+              </a:solidFill>
+            </a:endParaRPr>
+          </a:p>
+        </p:txBody>
+      </p:sp>
+      <p:sp>
+        <p:nvSpPr>
+          <p:cNvPr id="15" name="TextBox 14">
+            <a:extLst>
+              <a:ext uri="{FF2B5EF4-FFF2-40B4-BE49-F238E27FC236}">
+                <a16:creationId xmlns:a16="http://schemas.microsoft.com/office/drawing/2014/main" id="{8A589FE8-C6F7-4825-B891-45B0820059EB}"/>
+              </a:ext>
+            </a:extLst>
+          </p:cNvPr>
+          <p:cNvSpPr txBox="1"/>
+          <p:nvPr/>
+        </p:nvSpPr>
+        <p:spPr>
+          <a:xfrm>
+            <a:off x="3263317" y="260059"/>
+            <a:ext cx="5318621" cy="461665"/>
+          </a:xfrm>
+          <a:prstGeom prst="rect">
+            <a:avLst/>
+          </a:prstGeom>
+          <a:noFill/>
+        </p:spPr>
+        <p:txBody>
+          <a:bodyPr wrap="square" rtlCol="0">
+            <a:spAutoFit/>
+          </a:bodyPr>
+          <a:lstStyle/>
+          <a:p>
+            <a:pPr algn="ctr"/>
+            <a:r>
+              <a:rPr lang="en-US" altLang="ko-KR" sz="2400" dirty="0">
+                <a:solidFill>
+                  <a:schemeClr val="bg1"/>
+                </a:solidFill>
+              </a:rPr>
+              <a:t>Microservice structure</a:t>
+            </a:r>
+            <a:endParaRPr lang="ko-KR" altLang="en-US" sz="2400" dirty="0">
+              <a:solidFill>
+                <a:schemeClr val="bg1"/>
+              </a:solidFill>
+            </a:endParaRPr>
+          </a:p>
+        </p:txBody>
+      </p:sp>
+      <p:sp>
+        <p:nvSpPr>
+          <p:cNvPr id="16" name="직사각형 15">
+            <a:extLst>
+              <a:ext uri="{FF2B5EF4-FFF2-40B4-BE49-F238E27FC236}">
+                <a16:creationId xmlns:a16="http://schemas.microsoft.com/office/drawing/2014/main" id="{7BCFF158-250D-4C50-86F8-D0D479B8868D}"/>
+              </a:ext>
+            </a:extLst>
+          </p:cNvPr>
+          <p:cNvSpPr/>
+          <p:nvPr/>
+        </p:nvSpPr>
+        <p:spPr>
+          <a:xfrm>
+            <a:off x="4564725" y="1973595"/>
+            <a:ext cx="5075339" cy="3993160"/>
+          </a:xfrm>
+          <a:prstGeom prst="rect">
+            <a:avLst/>
+          </a:prstGeom>
+          <a:solidFill>
+            <a:srgbClr val="696969"/>
+          </a:solidFill>
+        </p:spPr>
+        <p:style>
+          <a:lnRef idx="2">
+            <a:schemeClr val="accent1">
+              <a:shade val="50000"/>
+            </a:schemeClr>
+          </a:lnRef>
+          <a:fillRef idx="1">
+            <a:schemeClr val="accent1"/>
+          </a:fillRef>
+          <a:effectRef idx="0">
+            <a:schemeClr val="accent1"/>
+          </a:effectRef>
+          <a:fontRef idx="minor">
+            <a:schemeClr val="lt1"/>
+          </a:fontRef>
+        </p:style>
+        <p:txBody>
+          <a:bodyPr rtlCol="0" anchor="ctr"/>
+          <a:lstStyle/>
+          <a:p>
+            <a:pPr algn="ctr"/>
+            <a:endParaRPr lang="ko-KR" altLang="en-US"/>
+          </a:p>
+        </p:txBody>
+      </p:sp>
+      <p:sp>
+        <p:nvSpPr>
+          <p:cNvPr id="18" name="직사각형 17">
+            <a:extLst>
+              <a:ext uri="{FF2B5EF4-FFF2-40B4-BE49-F238E27FC236}">
+                <a16:creationId xmlns:a16="http://schemas.microsoft.com/office/drawing/2014/main" id="{E303F3AE-FF6D-4298-86F9-650F4139CD8A}"/>
+              </a:ext>
+            </a:extLst>
+          </p:cNvPr>
+          <p:cNvSpPr/>
+          <p:nvPr/>
+        </p:nvSpPr>
+        <p:spPr>
+          <a:xfrm>
+            <a:off x="4296277" y="1263678"/>
+            <a:ext cx="5343787" cy="433914"/>
+          </a:xfrm>
+          <a:prstGeom prst="rect">
+            <a:avLst/>
+          </a:prstGeom>
+          <a:solidFill>
+            <a:schemeClr val="accent6">
+              <a:lumMod val="75000"/>
+            </a:schemeClr>
+          </a:solidFill>
+        </p:spPr>
+        <p:style>
+          <a:lnRef idx="2">
+            <a:schemeClr val="accent1">
+              <a:shade val="50000"/>
+            </a:schemeClr>
+          </a:lnRef>
+          <a:fillRef idx="1">
+            <a:schemeClr val="accent1"/>
+          </a:fillRef>
+          <a:effectRef idx="0">
+            <a:schemeClr val="accent1"/>
+          </a:effectRef>
+          <a:fontRef idx="minor">
+            <a:schemeClr val="lt1"/>
+          </a:fontRef>
+        </p:style>
+        <p:txBody>
+          <a:bodyPr rtlCol="0" anchor="ctr"/>
+          <a:lstStyle/>
+          <a:p>
+            <a:pPr algn="ctr"/>
+            <a:r>
+              <a:rPr lang="en-US" altLang="ko-KR" dirty="0"/>
+              <a:t>Database(MongoDB)</a:t>
+            </a:r>
+            <a:endParaRPr lang="ko-KR" altLang="en-US" dirty="0"/>
+          </a:p>
+        </p:txBody>
+      </p:sp>
+      <p:cxnSp>
+        <p:nvCxnSpPr>
+          <p:cNvPr id="20" name="직선 화살표 연결선 19">
+            <a:extLst>
+              <a:ext uri="{FF2B5EF4-FFF2-40B4-BE49-F238E27FC236}">
+                <a16:creationId xmlns:a16="http://schemas.microsoft.com/office/drawing/2014/main" id="{25DF555B-AE52-4720-806D-CA28CD8E1FC3}"/>
+              </a:ext>
+            </a:extLst>
+          </p:cNvPr>
+          <p:cNvCxnSpPr>
+            <a:cxnSpLocks/>
+          </p:cNvCxnSpPr>
+          <p:nvPr/>
+        </p:nvCxnSpPr>
+        <p:spPr>
+          <a:xfrm flipV="1">
+            <a:off x="5672071" y="1687507"/>
+            <a:ext cx="0" cy="443999"/>
+          </a:xfrm>
+          <a:prstGeom prst="straightConnector1">
+            <a:avLst/>
+          </a:prstGeom>
+          <a:ln>
+            <a:solidFill>
+              <a:schemeClr val="bg1"/>
+            </a:solidFill>
+            <a:tailEnd type="triangle"/>
+          </a:ln>
+        </p:spPr>
+        <p:style>
+          <a:lnRef idx="1">
+            <a:schemeClr val="accent1"/>
+          </a:lnRef>
+          <a:fillRef idx="0">
+            <a:schemeClr val="accent1"/>
+          </a:fillRef>
+          <a:effectRef idx="0">
+            <a:schemeClr val="accent1"/>
+          </a:effectRef>
+          <a:fontRef idx="minor">
+            <a:schemeClr val="tx1"/>
+          </a:fontRef>
+        </p:style>
+      </p:cxnSp>
+      <p:cxnSp>
+        <p:nvCxnSpPr>
+          <p:cNvPr id="22" name="직선 화살표 연결선 21">
+            <a:extLst>
+              <a:ext uri="{FF2B5EF4-FFF2-40B4-BE49-F238E27FC236}">
+                <a16:creationId xmlns:a16="http://schemas.microsoft.com/office/drawing/2014/main" id="{992B376D-BD04-42B1-817B-C82BEC667CEF}"/>
+              </a:ext>
+            </a:extLst>
+          </p:cNvPr>
+          <p:cNvCxnSpPr>
+            <a:cxnSpLocks/>
+          </p:cNvCxnSpPr>
+          <p:nvPr/>
+        </p:nvCxnSpPr>
+        <p:spPr>
+          <a:xfrm flipH="1">
+            <a:off x="6088727" y="1687507"/>
+            <a:ext cx="1" cy="433814"/>
+          </a:xfrm>
+          <a:prstGeom prst="straightConnector1">
+            <a:avLst/>
+          </a:prstGeom>
+          <a:ln>
+            <a:solidFill>
+              <a:schemeClr val="bg1"/>
+            </a:solidFill>
+            <a:tailEnd type="triangle"/>
+          </a:ln>
+        </p:spPr>
+        <p:style>
+          <a:lnRef idx="1">
+            <a:schemeClr val="accent1"/>
+          </a:lnRef>
+          <a:fillRef idx="0">
+            <a:schemeClr val="accent1"/>
+          </a:fillRef>
+          <a:effectRef idx="0">
+            <a:schemeClr val="accent1"/>
+          </a:effectRef>
+          <a:fontRef idx="minor">
+            <a:schemeClr val="tx1"/>
+          </a:fontRef>
+        </p:style>
+      </p:cxnSp>
+      <p:sp>
+        <p:nvSpPr>
+          <p:cNvPr id="23" name="직사각형 22">
+            <a:extLst>
+              <a:ext uri="{FF2B5EF4-FFF2-40B4-BE49-F238E27FC236}">
+                <a16:creationId xmlns:a16="http://schemas.microsoft.com/office/drawing/2014/main" id="{6CBC75D2-AF36-4933-A70E-3B3E97709228}"/>
+              </a:ext>
+            </a:extLst>
+          </p:cNvPr>
+          <p:cNvSpPr/>
+          <p:nvPr/>
+        </p:nvSpPr>
+        <p:spPr>
+          <a:xfrm>
+            <a:off x="7386222" y="2717794"/>
+            <a:ext cx="1272330" cy="520608"/>
+          </a:xfrm>
+          <a:prstGeom prst="rect">
+            <a:avLst/>
+          </a:prstGeom>
+        </p:spPr>
+        <p:style>
+          <a:lnRef idx="2">
+            <a:schemeClr val="accent1">
+              <a:shade val="50000"/>
+            </a:schemeClr>
+          </a:lnRef>
+          <a:fillRef idx="1">
+            <a:schemeClr val="accent1"/>
+          </a:fillRef>
+          <a:effectRef idx="0">
+            <a:schemeClr val="accent1"/>
+          </a:effectRef>
+          <a:fontRef idx="minor">
+            <a:schemeClr val="lt1"/>
+          </a:fontRef>
+        </p:style>
+        <p:txBody>
+          <a:bodyPr rtlCol="0" anchor="ctr"/>
+          <a:lstStyle/>
+          <a:p>
+            <a:pPr algn="ctr"/>
+            <a:r>
+              <a:rPr lang="en-US" altLang="ko-KR" dirty="0"/>
+              <a:t>LOGIN service</a:t>
+            </a:r>
+          </a:p>
+        </p:txBody>
+      </p:sp>
+      <p:cxnSp>
+        <p:nvCxnSpPr>
+          <p:cNvPr id="29" name="직선 화살표 연결선 28">
+            <a:extLst>
+              <a:ext uri="{FF2B5EF4-FFF2-40B4-BE49-F238E27FC236}">
+                <a16:creationId xmlns:a16="http://schemas.microsoft.com/office/drawing/2014/main" id="{2E6E5F8D-F920-4061-A906-A80A9C4E1247}"/>
+              </a:ext>
+            </a:extLst>
+          </p:cNvPr>
+          <p:cNvCxnSpPr/>
+          <p:nvPr/>
+        </p:nvCxnSpPr>
+        <p:spPr>
+          <a:xfrm>
+            <a:off x="4296277" y="2890093"/>
+            <a:ext cx="3061981" cy="0"/>
+          </a:xfrm>
+          <a:prstGeom prst="straightConnector1">
+            <a:avLst/>
+          </a:prstGeom>
+          <a:ln>
+            <a:solidFill>
+              <a:schemeClr val="bg1"/>
+            </a:solidFill>
+            <a:tailEnd type="triangle"/>
+          </a:ln>
+        </p:spPr>
+        <p:style>
+          <a:lnRef idx="1">
+            <a:schemeClr val="accent1"/>
+          </a:lnRef>
+          <a:fillRef idx="0">
+            <a:schemeClr val="accent1"/>
+          </a:fillRef>
+          <a:effectRef idx="0">
+            <a:schemeClr val="accent1"/>
+          </a:effectRef>
+          <a:fontRef idx="minor">
+            <a:schemeClr val="tx1"/>
+          </a:fontRef>
+        </p:style>
+      </p:cxnSp>
+      <p:cxnSp>
+        <p:nvCxnSpPr>
+          <p:cNvPr id="31" name="직선 화살표 연결선 30">
+            <a:extLst>
+              <a:ext uri="{FF2B5EF4-FFF2-40B4-BE49-F238E27FC236}">
+                <a16:creationId xmlns:a16="http://schemas.microsoft.com/office/drawing/2014/main" id="{E143D1A3-BDBB-42D8-B245-FC7D42BD0A1A}"/>
+              </a:ext>
+            </a:extLst>
+          </p:cNvPr>
+          <p:cNvCxnSpPr/>
+          <p:nvPr/>
+        </p:nvCxnSpPr>
+        <p:spPr>
+          <a:xfrm flipH="1">
+            <a:off x="4296277" y="3091428"/>
+            <a:ext cx="3089945" cy="0"/>
+          </a:xfrm>
+          <a:prstGeom prst="straightConnector1">
+            <a:avLst/>
+          </a:prstGeom>
+          <a:ln>
+            <a:solidFill>
+              <a:schemeClr val="bg1"/>
+            </a:solidFill>
+            <a:tailEnd type="triangle"/>
+          </a:ln>
+        </p:spPr>
+        <p:style>
+          <a:lnRef idx="1">
+            <a:schemeClr val="accent1"/>
+          </a:lnRef>
+          <a:fillRef idx="0">
+            <a:schemeClr val="accent1"/>
+          </a:fillRef>
+          <a:effectRef idx="0">
+            <a:schemeClr val="accent1"/>
+          </a:effectRef>
+          <a:fontRef idx="minor">
+            <a:schemeClr val="tx1"/>
+          </a:fontRef>
+        </p:style>
+      </p:cxnSp>
+      <p:sp>
+        <p:nvSpPr>
+          <p:cNvPr id="32" name="직사각형 31">
+            <a:extLst>
+              <a:ext uri="{FF2B5EF4-FFF2-40B4-BE49-F238E27FC236}">
+                <a16:creationId xmlns:a16="http://schemas.microsoft.com/office/drawing/2014/main" id="{C1EA8E91-3C03-456B-9037-E57C9073BAFE}"/>
+              </a:ext>
+            </a:extLst>
+          </p:cNvPr>
+          <p:cNvSpPr/>
+          <p:nvPr/>
+        </p:nvSpPr>
+        <p:spPr>
+          <a:xfrm>
+            <a:off x="4828153" y="3835949"/>
+            <a:ext cx="2204905" cy="520608"/>
+          </a:xfrm>
+          <a:prstGeom prst="rect">
+            <a:avLst/>
+          </a:prstGeom>
+        </p:spPr>
+        <p:style>
+          <a:lnRef idx="2">
+            <a:schemeClr val="accent1">
+              <a:shade val="50000"/>
+            </a:schemeClr>
+          </a:lnRef>
+          <a:fillRef idx="1">
+            <a:schemeClr val="accent1"/>
+          </a:fillRef>
+          <a:effectRef idx="0">
+            <a:schemeClr val="accent1"/>
+          </a:effectRef>
+          <a:fontRef idx="minor">
+            <a:schemeClr val="lt1"/>
+          </a:fontRef>
+        </p:style>
+        <p:txBody>
+          <a:bodyPr rtlCol="0" anchor="ctr"/>
+          <a:lstStyle/>
+          <a:p>
+            <a:pPr algn="ctr"/>
+            <a:r>
+              <a:rPr lang="en-US" altLang="ko-KR" dirty="0"/>
+              <a:t>VIEW service(</a:t>
+            </a:r>
+            <a:r>
+              <a:rPr lang="en-US" altLang="ko-KR" dirty="0" err="1"/>
+              <a:t>ejs</a:t>
+            </a:r>
+            <a:r>
+              <a:rPr lang="en-US" altLang="ko-KR" dirty="0"/>
+              <a:t>)</a:t>
+            </a:r>
+          </a:p>
+        </p:txBody>
+      </p:sp>
+      <p:cxnSp>
+        <p:nvCxnSpPr>
+          <p:cNvPr id="34" name="직선 화살표 연결선 33">
+            <a:extLst>
+              <a:ext uri="{FF2B5EF4-FFF2-40B4-BE49-F238E27FC236}">
+                <a16:creationId xmlns:a16="http://schemas.microsoft.com/office/drawing/2014/main" id="{CB0DE129-F8AB-4779-8ECA-79F73D1D9CE0}"/>
+              </a:ext>
+            </a:extLst>
+          </p:cNvPr>
+          <p:cNvCxnSpPr/>
+          <p:nvPr/>
+        </p:nvCxnSpPr>
+        <p:spPr>
+          <a:xfrm flipH="1">
+            <a:off x="4281470" y="3959930"/>
+            <a:ext cx="546684" cy="0"/>
+          </a:xfrm>
+          <a:prstGeom prst="straightConnector1">
+            <a:avLst/>
+          </a:prstGeom>
+          <a:ln>
+            <a:solidFill>
+              <a:schemeClr val="bg1"/>
+            </a:solidFill>
+            <a:tailEnd type="triangle"/>
+          </a:ln>
+        </p:spPr>
+        <p:style>
+          <a:lnRef idx="1">
+            <a:schemeClr val="accent1"/>
+          </a:lnRef>
+          <a:fillRef idx="0">
+            <a:schemeClr val="accent1"/>
+          </a:fillRef>
+          <a:effectRef idx="0">
+            <a:schemeClr val="accent1"/>
+          </a:effectRef>
+          <a:fontRef idx="minor">
+            <a:schemeClr val="tx1"/>
+          </a:fontRef>
+        </p:style>
+      </p:cxnSp>
+      <p:cxnSp>
+        <p:nvCxnSpPr>
+          <p:cNvPr id="36" name="직선 화살표 연결선 35">
+            <a:extLst>
+              <a:ext uri="{FF2B5EF4-FFF2-40B4-BE49-F238E27FC236}">
+                <a16:creationId xmlns:a16="http://schemas.microsoft.com/office/drawing/2014/main" id="{939B903E-136A-464F-BC32-8B4C5C95C48F}"/>
+              </a:ext>
+            </a:extLst>
+          </p:cNvPr>
+          <p:cNvCxnSpPr/>
+          <p:nvPr/>
+        </p:nvCxnSpPr>
+        <p:spPr>
+          <a:xfrm>
+            <a:off x="4281470" y="4171752"/>
+            <a:ext cx="546684" cy="0"/>
+          </a:xfrm>
+          <a:prstGeom prst="straightConnector1">
+            <a:avLst/>
+          </a:prstGeom>
+          <a:ln>
+            <a:solidFill>
+              <a:schemeClr val="bg1"/>
+            </a:solidFill>
+            <a:tailEnd type="triangle"/>
+          </a:ln>
+        </p:spPr>
+        <p:style>
+          <a:lnRef idx="1">
+            <a:schemeClr val="accent1"/>
+          </a:lnRef>
+          <a:fillRef idx="0">
+            <a:schemeClr val="accent1"/>
+          </a:fillRef>
+          <a:effectRef idx="0">
+            <a:schemeClr val="accent1"/>
+          </a:effectRef>
+          <a:fontRef idx="minor">
+            <a:schemeClr val="tx1"/>
+          </a:fontRef>
+        </p:style>
+      </p:cxnSp>
+      <p:sp>
+        <p:nvSpPr>
+          <p:cNvPr id="37" name="직사각형 36">
+            <a:extLst>
+              <a:ext uri="{FF2B5EF4-FFF2-40B4-BE49-F238E27FC236}">
+                <a16:creationId xmlns:a16="http://schemas.microsoft.com/office/drawing/2014/main" id="{3F611FAA-6D5E-441F-B480-6BD0797F4E75}"/>
+              </a:ext>
+            </a:extLst>
+          </p:cNvPr>
+          <p:cNvSpPr/>
+          <p:nvPr/>
+        </p:nvSpPr>
+        <p:spPr>
+          <a:xfrm>
+            <a:off x="4674484" y="2131506"/>
+            <a:ext cx="2170933" cy="520608"/>
+          </a:xfrm>
+          <a:prstGeom prst="rect">
+            <a:avLst/>
+          </a:prstGeom>
+        </p:spPr>
+        <p:style>
+          <a:lnRef idx="2">
+            <a:schemeClr val="accent1">
+              <a:shade val="50000"/>
+            </a:schemeClr>
+          </a:lnRef>
+          <a:fillRef idx="1">
+            <a:schemeClr val="accent1"/>
+          </a:fillRef>
+          <a:effectRef idx="0">
+            <a:schemeClr val="accent1"/>
+          </a:effectRef>
+          <a:fontRef idx="minor">
+            <a:schemeClr val="lt1"/>
+          </a:fontRef>
+        </p:style>
+        <p:txBody>
+          <a:bodyPr rtlCol="0" anchor="ctr"/>
+          <a:lstStyle/>
+          <a:p>
+            <a:pPr algn="ctr"/>
+            <a:r>
+              <a:rPr lang="en-US" altLang="ko-KR" dirty="0" err="1"/>
+              <a:t>Board,Comment</a:t>
+            </a:r>
+            <a:r>
+              <a:rPr lang="en-US" altLang="ko-KR" dirty="0"/>
+              <a:t> service</a:t>
+            </a:r>
+          </a:p>
+        </p:txBody>
+      </p:sp>
+      <p:cxnSp>
+        <p:nvCxnSpPr>
+          <p:cNvPr id="40" name="직선 화살표 연결선 39">
+            <a:extLst>
+              <a:ext uri="{FF2B5EF4-FFF2-40B4-BE49-F238E27FC236}">
+                <a16:creationId xmlns:a16="http://schemas.microsoft.com/office/drawing/2014/main" id="{FC85E2B6-0452-458A-A366-207FDC08E355}"/>
+              </a:ext>
+            </a:extLst>
+          </p:cNvPr>
+          <p:cNvCxnSpPr>
+            <a:cxnSpLocks/>
+          </p:cNvCxnSpPr>
+          <p:nvPr/>
+        </p:nvCxnSpPr>
+        <p:spPr>
+          <a:xfrm flipH="1">
+            <a:off x="4313054" y="2231472"/>
+            <a:ext cx="361430" cy="0"/>
+          </a:xfrm>
+          <a:prstGeom prst="straightConnector1">
+            <a:avLst/>
+          </a:prstGeom>
+          <a:ln>
+            <a:solidFill>
+              <a:schemeClr val="bg1"/>
+            </a:solidFill>
+            <a:tailEnd type="triangle"/>
+          </a:ln>
+        </p:spPr>
+        <p:style>
+          <a:lnRef idx="1">
+            <a:schemeClr val="accent1"/>
+          </a:lnRef>
+          <a:fillRef idx="0">
+            <a:schemeClr val="accent1"/>
+          </a:fillRef>
+          <a:effectRef idx="0">
+            <a:schemeClr val="accent1"/>
+          </a:effectRef>
+          <a:fontRef idx="minor">
+            <a:schemeClr val="tx1"/>
+          </a:fontRef>
+        </p:style>
+      </p:cxnSp>
+      <p:cxnSp>
+        <p:nvCxnSpPr>
+          <p:cNvPr id="42" name="직선 화살표 연결선 41">
+            <a:extLst>
+              <a:ext uri="{FF2B5EF4-FFF2-40B4-BE49-F238E27FC236}">
+                <a16:creationId xmlns:a16="http://schemas.microsoft.com/office/drawing/2014/main" id="{8E968767-A43D-4F33-BA3C-942196FC0A82}"/>
+              </a:ext>
+            </a:extLst>
+          </p:cNvPr>
+          <p:cNvCxnSpPr>
+            <a:cxnSpLocks/>
+          </p:cNvCxnSpPr>
+          <p:nvPr/>
+        </p:nvCxnSpPr>
+        <p:spPr>
+          <a:xfrm>
+            <a:off x="4353663" y="2466363"/>
+            <a:ext cx="320821" cy="0"/>
+          </a:xfrm>
+          <a:prstGeom prst="straightConnector1">
+            <a:avLst/>
+          </a:prstGeom>
+          <a:ln>
+            <a:solidFill>
+              <a:schemeClr val="bg1"/>
+            </a:solidFill>
+            <a:tailEnd type="triangle"/>
+          </a:ln>
+        </p:spPr>
+        <p:style>
+          <a:lnRef idx="1">
+            <a:schemeClr val="accent1"/>
+          </a:lnRef>
+          <a:fillRef idx="0">
+            <a:schemeClr val="accent1"/>
+          </a:fillRef>
+          <a:effectRef idx="0">
+            <a:schemeClr val="accent1"/>
+          </a:effectRef>
+          <a:fontRef idx="minor">
+            <a:schemeClr val="tx1"/>
+          </a:fontRef>
+        </p:style>
+      </p:cxnSp>
+      <p:sp>
+        <p:nvSpPr>
+          <p:cNvPr id="49" name="직사각형 48">
+            <a:extLst>
+              <a:ext uri="{FF2B5EF4-FFF2-40B4-BE49-F238E27FC236}">
+                <a16:creationId xmlns:a16="http://schemas.microsoft.com/office/drawing/2014/main" id="{36E0198B-4260-4A9D-995E-71E24850C168}"/>
+              </a:ext>
+            </a:extLst>
+          </p:cNvPr>
+          <p:cNvSpPr/>
+          <p:nvPr/>
+        </p:nvSpPr>
+        <p:spPr>
+          <a:xfrm>
+            <a:off x="5205084" y="4879901"/>
+            <a:ext cx="1272330" cy="520608"/>
+          </a:xfrm>
+          <a:prstGeom prst="rect">
+            <a:avLst/>
+          </a:prstGeom>
+        </p:spPr>
+        <p:style>
+          <a:lnRef idx="2">
+            <a:schemeClr val="accent1">
+              <a:shade val="50000"/>
+            </a:schemeClr>
+          </a:lnRef>
+          <a:fillRef idx="1">
+            <a:schemeClr val="accent1"/>
+          </a:fillRef>
+          <a:effectRef idx="0">
+            <a:schemeClr val="accent1"/>
+          </a:effectRef>
+          <a:fontRef idx="minor">
+            <a:schemeClr val="lt1"/>
+          </a:fontRef>
+        </p:style>
+        <p:txBody>
+          <a:bodyPr rtlCol="0" anchor="ctr"/>
+          <a:lstStyle/>
+          <a:p>
+            <a:pPr algn="ctr"/>
+            <a:r>
+              <a:rPr lang="en-US" altLang="ko-KR" dirty="0"/>
+              <a:t>auth service</a:t>
+            </a:r>
+          </a:p>
+        </p:txBody>
+      </p:sp>
+      <p:cxnSp>
+        <p:nvCxnSpPr>
+          <p:cNvPr id="53" name="직선 화살표 연결선 52">
+            <a:extLst>
+              <a:ext uri="{FF2B5EF4-FFF2-40B4-BE49-F238E27FC236}">
+                <a16:creationId xmlns:a16="http://schemas.microsoft.com/office/drawing/2014/main" id="{FF36493C-BAC7-4BDD-A168-758FEF65FB6E}"/>
+              </a:ext>
+            </a:extLst>
+          </p:cNvPr>
+          <p:cNvCxnSpPr/>
+          <p:nvPr/>
+        </p:nvCxnSpPr>
+        <p:spPr>
+          <a:xfrm>
+            <a:off x="4281470" y="5040501"/>
+            <a:ext cx="923614" cy="0"/>
+          </a:xfrm>
+          <a:prstGeom prst="straightConnector1">
+            <a:avLst/>
+          </a:prstGeom>
+          <a:ln>
+            <a:solidFill>
+              <a:schemeClr val="bg1"/>
+            </a:solidFill>
+            <a:tailEnd type="triangle"/>
+          </a:ln>
+        </p:spPr>
+        <p:style>
+          <a:lnRef idx="1">
+            <a:schemeClr val="accent1"/>
+          </a:lnRef>
+          <a:fillRef idx="0">
+            <a:schemeClr val="accent1"/>
+          </a:fillRef>
+          <a:effectRef idx="0">
+            <a:schemeClr val="accent1"/>
+          </a:effectRef>
+          <a:fontRef idx="minor">
+            <a:schemeClr val="tx1"/>
+          </a:fontRef>
+        </p:style>
+      </p:cxnSp>
+      <p:cxnSp>
+        <p:nvCxnSpPr>
+          <p:cNvPr id="55" name="직선 화살표 연결선 54">
+            <a:extLst>
+              <a:ext uri="{FF2B5EF4-FFF2-40B4-BE49-F238E27FC236}">
+                <a16:creationId xmlns:a16="http://schemas.microsoft.com/office/drawing/2014/main" id="{07A110D0-F41F-4FD3-BF10-EC7DC90B5C7F}"/>
+              </a:ext>
+            </a:extLst>
+          </p:cNvPr>
+          <p:cNvCxnSpPr/>
+          <p:nvPr/>
+        </p:nvCxnSpPr>
+        <p:spPr>
+          <a:xfrm flipH="1">
+            <a:off x="4296276" y="5341015"/>
+            <a:ext cx="908808" cy="0"/>
+          </a:xfrm>
+          <a:prstGeom prst="straightConnector1">
+            <a:avLst/>
+          </a:prstGeom>
+          <a:ln>
+            <a:solidFill>
+              <a:schemeClr val="bg1"/>
+            </a:solidFill>
+            <a:tailEnd type="triangle"/>
+          </a:ln>
+        </p:spPr>
+        <p:style>
+          <a:lnRef idx="1">
+            <a:schemeClr val="accent1"/>
+          </a:lnRef>
+          <a:fillRef idx="0">
+            <a:schemeClr val="accent1"/>
+          </a:fillRef>
+          <a:effectRef idx="0">
+            <a:schemeClr val="accent1"/>
+          </a:effectRef>
+          <a:fontRef idx="minor">
+            <a:schemeClr val="tx1"/>
+          </a:fontRef>
+        </p:style>
+      </p:cxnSp>
+      <p:cxnSp>
+        <p:nvCxnSpPr>
+          <p:cNvPr id="14" name="직선 화살표 연결선 13">
+            <a:extLst>
+              <a:ext uri="{FF2B5EF4-FFF2-40B4-BE49-F238E27FC236}">
+                <a16:creationId xmlns:a16="http://schemas.microsoft.com/office/drawing/2014/main" id="{6DCCE271-0819-4446-81BD-D498E26208FB}"/>
+              </a:ext>
+            </a:extLst>
+          </p:cNvPr>
+          <p:cNvCxnSpPr>
+            <a:cxnSpLocks/>
+          </p:cNvCxnSpPr>
+          <p:nvPr/>
+        </p:nvCxnSpPr>
+        <p:spPr>
+          <a:xfrm>
+            <a:off x="7592037" y="1687507"/>
+            <a:ext cx="0" cy="1030287"/>
+          </a:xfrm>
+          <a:prstGeom prst="straightConnector1">
+            <a:avLst/>
+          </a:prstGeom>
+          <a:ln>
+            <a:solidFill>
+              <a:schemeClr val="bg1"/>
+            </a:solidFill>
+            <a:tailEnd type="triangle"/>
+          </a:ln>
+        </p:spPr>
+        <p:style>
+          <a:lnRef idx="1">
+            <a:schemeClr val="accent1"/>
+          </a:lnRef>
+          <a:fillRef idx="0">
+            <a:schemeClr val="accent1"/>
+          </a:fillRef>
+          <a:effectRef idx="0">
+            <a:schemeClr val="accent1"/>
+          </a:effectRef>
+          <a:fontRef idx="minor">
+            <a:schemeClr val="tx1"/>
+          </a:fontRef>
+        </p:style>
+      </p:cxnSp>
+      <p:cxnSp>
+        <p:nvCxnSpPr>
+          <p:cNvPr id="21" name="직선 화살표 연결선 20">
+            <a:extLst>
+              <a:ext uri="{FF2B5EF4-FFF2-40B4-BE49-F238E27FC236}">
+                <a16:creationId xmlns:a16="http://schemas.microsoft.com/office/drawing/2014/main" id="{D01ECEA7-256B-47A6-BDD1-1C8D35C1B003}"/>
+              </a:ext>
+            </a:extLst>
+          </p:cNvPr>
+          <p:cNvCxnSpPr>
+            <a:stCxn id="23" idx="0"/>
+          </p:cNvCxnSpPr>
+          <p:nvPr/>
+        </p:nvCxnSpPr>
+        <p:spPr>
+          <a:xfrm flipV="1">
+            <a:off x="8022387" y="1687507"/>
+            <a:ext cx="0" cy="1030287"/>
+          </a:xfrm>
+          <a:prstGeom prst="straightConnector1">
+            <a:avLst/>
+          </a:prstGeom>
+          <a:ln>
+            <a:solidFill>
+              <a:schemeClr val="bg1"/>
+            </a:solidFill>
+            <a:tailEnd type="triangle"/>
+          </a:ln>
+        </p:spPr>
+        <p:style>
+          <a:lnRef idx="1">
+            <a:schemeClr val="accent1"/>
+          </a:lnRef>
+          <a:fillRef idx="0">
+            <a:schemeClr val="accent1"/>
+          </a:fillRef>
+          <a:effectRef idx="0">
+            <a:schemeClr val="accent1"/>
+          </a:effectRef>
+          <a:fontRef idx="minor">
+            <a:schemeClr val="tx1"/>
+          </a:fontRef>
+        </p:style>
+      </p:cxnSp>
+    </p:spTree>
+    <p:extLst>
+      <p:ext uri="{BB962C8B-B14F-4D97-AF65-F5344CB8AC3E}">
+        <p14:creationId xmlns:p14="http://schemas.microsoft.com/office/powerpoint/2010/main" val="2460629553"/>
       </p:ext>
     </p:extLst>
   </p:cSld>

</xml_diff>